<commit_message>
Tweaks to slides made in class today
</commit_message>
<xml_diff>
--- a/Week 2/Week 2.pptx
+++ b/Week 2/Week 2.pptx
@@ -167,7 +167,7 @@
   </p:defaultTextStyle>
   <p:extLst>
     <p:ext uri="{EFAFB233-063F-42B5-8137-9DF3F51BA10A}">
-      <p15:sldGuideLst xmlns="" xmlns:p15="http://schemas.microsoft.com/office/powerpoint/2012/main">
+      <p15:sldGuideLst xmlns:p15="http://schemas.microsoft.com/office/powerpoint/2012/main" xmlns="">
         <p15:guide id="1" orient="horz" pos="2160">
           <p15:clr>
             <a:srgbClr val="A4A3A4"/>
@@ -303,11 +303,11 @@
         </c:dLbls>
         <c:marker val="1"/>
         <c:smooth val="0"/>
-        <c:axId val="2071828504"/>
-        <c:axId val="2071831976"/>
+        <c:axId val="2064788184"/>
+        <c:axId val="2066944280"/>
       </c:lineChart>
       <c:catAx>
-        <c:axId val="2071828504"/>
+        <c:axId val="2064788184"/>
         <c:scaling>
           <c:orientation val="minMax"/>
         </c:scaling>
@@ -331,7 +331,7 @@
         <c:majorTickMark val="out"/>
         <c:minorTickMark val="none"/>
         <c:tickLblPos val="nextTo"/>
-        <c:crossAx val="2071831976"/>
+        <c:crossAx val="2066944280"/>
         <c:crosses val="autoZero"/>
         <c:auto val="1"/>
         <c:lblAlgn val="ctr"/>
@@ -339,7 +339,7 @@
         <c:noMultiLvlLbl val="0"/>
       </c:catAx>
       <c:valAx>
-        <c:axId val="2071831976"/>
+        <c:axId val="2066944280"/>
         <c:scaling>
           <c:orientation val="minMax"/>
         </c:scaling>
@@ -390,7 +390,7 @@
             <a:endParaRPr lang="en-US"/>
           </a:p>
         </c:txPr>
-        <c:crossAx val="2071828504"/>
+        <c:crossAx val="2064788184"/>
         <c:crosses val="autoZero"/>
         <c:crossBetween val="between"/>
       </c:valAx>
@@ -545,11 +545,11 @@
           <c:showBubbleSize val="0"/>
         </c:dLbls>
         <c:gapWidth val="150"/>
-        <c:axId val="2071847928"/>
-        <c:axId val="2071851432"/>
+        <c:axId val="2079856168"/>
+        <c:axId val="2079859640"/>
       </c:barChart>
       <c:catAx>
-        <c:axId val="2071847928"/>
+        <c:axId val="2079856168"/>
         <c:scaling>
           <c:orientation val="minMax"/>
         </c:scaling>
@@ -573,7 +573,7 @@
         <c:majorTickMark val="none"/>
         <c:minorTickMark val="none"/>
         <c:tickLblPos val="nextTo"/>
-        <c:crossAx val="2071851432"/>
+        <c:crossAx val="2079859640"/>
         <c:crosses val="autoZero"/>
         <c:auto val="1"/>
         <c:lblAlgn val="ctr"/>
@@ -581,7 +581,7 @@
         <c:noMultiLvlLbl val="0"/>
       </c:catAx>
       <c:valAx>
-        <c:axId val="2071851432"/>
+        <c:axId val="2079859640"/>
         <c:scaling>
           <c:orientation val="minMax"/>
         </c:scaling>
@@ -638,7 +638,7 @@
             <a:endParaRPr lang="en-US"/>
           </a:p>
         </c:txPr>
-        <c:crossAx val="2071847928"/>
+        <c:crossAx val="2079856168"/>
         <c:crosses val="autoZero"/>
         <c:crossBetween val="between"/>
       </c:valAx>
@@ -10858,6 +10858,13 @@
   <p:clrMapOvr>
     <a:masterClrMapping/>
   </p:clrMapOvr>
+  <p:timing>
+    <p:tnLst>
+      <p:par>
+        <p:cTn xmlns:p14="http://schemas.microsoft.com/office/powerpoint/2010/main" id="1" dur="indefinite" restart="never" nodeType="tmRoot"/>
+      </p:par>
+    </p:tnLst>
+  </p:timing>
 </p:sld>
 </file>
 
@@ -13479,6 +13486,13 @@
   <p:clrMapOvr>
     <a:masterClrMapping/>
   </p:clrMapOvr>
+  <p:timing>
+    <p:tnLst>
+      <p:par>
+        <p:cTn xmlns:p14="http://schemas.microsoft.com/office/powerpoint/2010/main" id="1" dur="indefinite" restart="never" nodeType="tmRoot"/>
+      </p:par>
+    </p:tnLst>
+  </p:timing>
 </p:sld>
 </file>
 
@@ -14401,6 +14415,13 @@
   <p:clrMapOvr>
     <a:masterClrMapping/>
   </p:clrMapOvr>
+  <p:timing>
+    <p:tnLst>
+      <p:par>
+        <p:cTn xmlns:p14="http://schemas.microsoft.com/office/powerpoint/2010/main" id="1" dur="indefinite" restart="never" nodeType="tmRoot"/>
+      </p:par>
+    </p:tnLst>
+  </p:timing>
 </p:sld>
 </file>
 
@@ -19237,6 +19258,13 @@
   <p:clrMapOvr>
     <a:masterClrMapping/>
   </p:clrMapOvr>
+  <p:timing>
+    <p:tnLst>
+      <p:par>
+        <p:cTn xmlns:p14="http://schemas.microsoft.com/office/powerpoint/2010/main" id="1" dur="indefinite" restart="never" nodeType="tmRoot"/>
+      </p:par>
+    </p:tnLst>
+  </p:timing>
 </p:sld>
 </file>
 
@@ -20053,6 +20081,13 @@
   <p:clrMapOvr>
     <a:masterClrMapping/>
   </p:clrMapOvr>
+  <p:timing>
+    <p:tnLst>
+      <p:par>
+        <p:cTn xmlns:p14="http://schemas.microsoft.com/office/powerpoint/2010/main" id="1" dur="indefinite" restart="never" nodeType="tmRoot"/>
+      </p:par>
+    </p:tnLst>
+  </p:timing>
 </p:sld>
 </file>
 
@@ -20241,6 +20276,13 @@
   <p:clrMapOvr>
     <a:masterClrMapping/>
   </p:clrMapOvr>
+  <p:timing>
+    <p:tnLst>
+      <p:par>
+        <p:cTn xmlns:p14="http://schemas.microsoft.com/office/powerpoint/2010/main" id="1" dur="indefinite" restart="never" nodeType="tmRoot"/>
+      </p:par>
+    </p:tnLst>
+  </p:timing>
 </p:sld>
 </file>
 
@@ -20302,7 +20344,12 @@
             <p:ph idx="1"/>
           </p:nvPr>
         </p:nvSpPr>
-        <p:spPr/>
+        <p:spPr>
+          <a:xfrm>
+            <a:off x="457200" y="1600200"/>
+            <a:ext cx="8534400" cy="4525963"/>
+          </a:xfrm>
+        </p:spPr>
         <p:txBody>
           <a:bodyPr>
             <a:normAutofit/>
@@ -20322,35 +20369,7 @@
             <a:pPr lvl="1"/>
             <a:r>
               <a:rPr lang="en-US" dirty="0" smtClean="0"/>
-              <a:t>In </a:t>
-            </a:r>
-            <a:r>
-              <a:rPr lang="en-US" dirty="0" smtClean="0"/>
-              <a:t>the “connect” page, r</a:t>
-            </a:r>
-            <a:r>
-              <a:rPr lang="en-US" dirty="0" smtClean="0"/>
-              <a:t>ight</a:t>
-            </a:r>
-            <a:r>
-              <a:rPr lang="en-US" dirty="0" smtClean="0"/>
-              <a:t>-click on </a:t>
-            </a:r>
-            <a:r>
-              <a:rPr lang="en-US" dirty="0" smtClean="0"/>
-              <a:t>repo, </a:t>
-            </a:r>
-            <a:r>
-              <a:rPr lang="en-US" dirty="0" smtClean="0"/>
-              <a:t>select </a:t>
-            </a:r>
-            <a:r>
-              <a:rPr lang="en-US" dirty="0" smtClean="0"/>
-              <a:t>“Command-line </a:t>
-            </a:r>
-            <a:r>
-              <a:rPr lang="en-US" dirty="0" smtClean="0"/>
-              <a:t>Here”</a:t>
+              <a:t>In the “connect” page, right-click on repo, select “Command-line Here”</a:t>
             </a:r>
           </a:p>
           <a:p>
@@ -20391,7 +20410,19 @@
                 </a:highlight>
                 <a:latin typeface="Consolas" panose="020B0609020204030204" pitchFamily="49" charset="0"/>
               </a:rPr>
-              <a:t> </a:t>
+              <a:t> remote add </a:t>
+            </a:r>
+            <a:r>
+              <a:rPr lang="en-US" sz="1600" dirty="0">
+                <a:solidFill>
+                  <a:srgbClr val="000000"/>
+                </a:solidFill>
+                <a:highlight>
+                  <a:srgbClr val="FFFFFF"/>
+                </a:highlight>
+                <a:latin typeface="Consolas" panose="020B0609020204030204" pitchFamily="49" charset="0"/>
+              </a:rPr>
+              <a:t>upstream </a:t>
             </a:r>
             <a:r>
               <a:rPr lang="en-US" sz="1600" dirty="0" smtClean="0">
@@ -20402,33 +20433,9 @@
                   <a:srgbClr val="FFFFFF"/>
                 </a:highlight>
                 <a:latin typeface="Consolas" panose="020B0609020204030204" pitchFamily="49" charset="0"/>
-              </a:rPr>
-              <a:t>remote add </a:t>
-            </a:r>
-            <a:r>
-              <a:rPr lang="en-US" sz="1600" dirty="0">
-                <a:solidFill>
-                  <a:srgbClr val="000000"/>
-                </a:solidFill>
-                <a:highlight>
-                  <a:srgbClr val="FFFFFF"/>
-                </a:highlight>
-                <a:latin typeface="Consolas" panose="020B0609020204030204" pitchFamily="49" charset="0"/>
-              </a:rPr>
-              <a:t>upstream </a:t>
-            </a:r>
-            <a:r>
-              <a:rPr lang="en-US" sz="1600" dirty="0">
-                <a:solidFill>
-                  <a:srgbClr val="000000"/>
-                </a:solidFill>
-                <a:highlight>
-                  <a:srgbClr val="FFFFFF"/>
-                </a:highlight>
-                <a:latin typeface="Consolas" panose="020B0609020204030204" pitchFamily="49" charset="0"/>
                 <a:hlinkClick r:id="rId2"/>
               </a:rPr>
-              <a:t>git@github.com:EE590</a:t>
+              <a:t>https://</a:t>
             </a:r>
             <a:r>
               <a:rPr lang="en-US" sz="1600" dirty="0" smtClean="0">
@@ -20441,7 +20448,7 @@
                 <a:latin typeface="Consolas" panose="020B0609020204030204" pitchFamily="49" charset="0"/>
                 <a:hlinkClick r:id="rId2"/>
               </a:rPr>
-              <a:t>-</a:t>
+              <a:t>github.com/EE590</a:t>
             </a:r>
             <a:r>
               <a:rPr lang="en-US" sz="1600" dirty="0" smtClean="0">
@@ -20454,20 +20461,7 @@
                 <a:latin typeface="Consolas" panose="020B0609020204030204" pitchFamily="49" charset="0"/>
                 <a:hlinkClick r:id="rId2"/>
               </a:rPr>
-              <a:t>Winter</a:t>
-            </a:r>
-            <a:r>
-              <a:rPr lang="en-US" sz="1600" dirty="0" smtClean="0">
-                <a:solidFill>
-                  <a:srgbClr val="000000"/>
-                </a:solidFill>
-                <a:highlight>
-                  <a:srgbClr val="FFFFFF"/>
-                </a:highlight>
-                <a:latin typeface="Consolas" panose="020B0609020204030204" pitchFamily="49" charset="0"/>
-                <a:hlinkClick r:id="rId2"/>
-              </a:rPr>
-              <a:t>2015/</a:t>
+              <a:t>-Winter2015/</a:t>
             </a:r>
             <a:r>
               <a:rPr lang="en-US" sz="1600" dirty="0">
@@ -20531,19 +20525,7 @@
                 </a:highlight>
                 <a:latin typeface="Consolas" panose="020B0609020204030204" pitchFamily="49" charset="0"/>
               </a:rPr>
-              <a:t> </a:t>
-            </a:r>
-            <a:r>
-              <a:rPr lang="en-US" sz="1600" dirty="0" smtClean="0">
-                <a:solidFill>
-                  <a:srgbClr val="000000"/>
-                </a:solidFill>
-                <a:highlight>
-                  <a:srgbClr val="FFFFFF"/>
-                </a:highlight>
-                <a:latin typeface="Consolas" panose="020B0609020204030204" pitchFamily="49" charset="0"/>
-              </a:rPr>
-              <a:t>pull upstream master</a:t>
+              <a:t> pull upstream master</a:t>
             </a:r>
             <a:endParaRPr lang="en-US" dirty="0"/>
           </a:p>
@@ -20815,6 +20797,13 @@
   <p:clrMapOvr>
     <a:masterClrMapping/>
   </p:clrMapOvr>
+  <p:timing>
+    <p:tnLst>
+      <p:par>
+        <p:cTn xmlns:p14="http://schemas.microsoft.com/office/powerpoint/2010/main" id="1" dur="indefinite" restart="never" nodeType="tmRoot"/>
+      </p:par>
+    </p:tnLst>
+  </p:timing>
 </p:sld>
 </file>
 
@@ -21154,6 +21143,13 @@
   <p:clrMapOvr>
     <a:masterClrMapping/>
   </p:clrMapOvr>
+  <p:timing>
+    <p:tnLst>
+      <p:par>
+        <p:cTn xmlns:p14="http://schemas.microsoft.com/office/powerpoint/2010/main" id="1" dur="indefinite" restart="never" nodeType="tmRoot"/>
+      </p:par>
+    </p:tnLst>
+  </p:timing>
 </p:sld>
 </file>
 
@@ -24332,6 +24328,13 @@
   <p:clrMapOvr>
     <a:masterClrMapping/>
   </p:clrMapOvr>
+  <p:timing>
+    <p:tnLst>
+      <p:par>
+        <p:cTn xmlns:p14="http://schemas.microsoft.com/office/powerpoint/2010/main" id="1" dur="indefinite" restart="never" nodeType="tmRoot"/>
+      </p:par>
+    </p:tnLst>
+  </p:timing>
 </p:sld>
 </file>
 
@@ -25251,6 +25254,13 @@
   <p:clrMapOvr>
     <a:masterClrMapping/>
   </p:clrMapOvr>
+  <p:timing>
+    <p:tnLst>
+      <p:par>
+        <p:cTn xmlns:p14="http://schemas.microsoft.com/office/powerpoint/2010/main" id="1" dur="indefinite" restart="never" nodeType="tmRoot"/>
+      </p:par>
+    </p:tnLst>
+  </p:timing>
 </p:sld>
 </file>
 
@@ -25485,19 +25495,7 @@
                 </a:highlight>
                 <a:latin typeface="Consolas" panose="020B0609020204030204" pitchFamily="49" charset="0"/>
               </a:rPr>
-              <a:t>, </a:t>
-            </a:r>
-            <a:r>
-              <a:rPr lang="en-US" sz="1600" dirty="0" smtClean="0">
-                <a:solidFill>
-                  <a:srgbClr val="000000"/>
-                </a:solidFill>
-                <a:highlight>
-                  <a:srgbClr val="FFFFFF"/>
-                </a:highlight>
-                <a:latin typeface="Consolas" panose="020B0609020204030204" pitchFamily="49" charset="0"/>
-              </a:rPr>
-              <a:t>() =&gt;</a:t>
+              <a:t>, () =&gt;</a:t>
             </a:r>
           </a:p>
           <a:p>
@@ -25676,12 +25674,6 @@
               </a:rPr>
               <a:t>That lambda will be executed on the UI thread!</a:t>
             </a:r>
-            <a:endParaRPr lang="en-US" dirty="0" smtClean="0">
-              <a:solidFill>
-                <a:srgbClr val="7F7F7F"/>
-              </a:solidFill>
-              <a:latin typeface="Century Gothic" panose="020B0502020202020204" pitchFamily="34" charset="0"/>
-            </a:endParaRPr>
           </a:p>
         </p:txBody>
       </p:sp>
@@ -26524,6 +26516,13 @@
   <p:clrMapOvr>
     <a:masterClrMapping/>
   </p:clrMapOvr>
+  <p:timing>
+    <p:tnLst>
+      <p:par>
+        <p:cTn xmlns:p14="http://schemas.microsoft.com/office/powerpoint/2010/main" id="1" dur="indefinite" restart="never" nodeType="tmRoot"/>
+      </p:par>
+    </p:tnLst>
+  </p:timing>
 </p:sld>
 </file>
 
@@ -26640,6 +26639,13 @@
   <p:clrMapOvr>
     <a:masterClrMapping/>
   </p:clrMapOvr>
+  <p:timing>
+    <p:tnLst>
+      <p:par>
+        <p:cTn xmlns:p14="http://schemas.microsoft.com/office/powerpoint/2010/main" id="1" dur="indefinite" restart="never" nodeType="tmRoot"/>
+      </p:par>
+    </p:tnLst>
+  </p:timing>
 </p:sld>
 </file>
 
@@ -26744,6 +26750,13 @@
   <p:clrMapOvr>
     <a:masterClrMapping/>
   </p:clrMapOvr>
+  <p:timing>
+    <p:tnLst>
+      <p:par>
+        <p:cTn xmlns:p14="http://schemas.microsoft.com/office/powerpoint/2010/main" id="1" dur="indefinite" restart="never" nodeType="tmRoot"/>
+      </p:par>
+    </p:tnLst>
+  </p:timing>
 </p:sld>
 </file>
 
@@ -26804,25 +26817,15 @@
           <a:p>
             <a:r>
               <a:rPr lang="en-US" dirty="0" smtClean="0"/>
-              <a:t>Sensors </a:t>
-            </a:r>
-            <a:r>
-              <a:rPr lang="en-US" dirty="0" smtClean="0"/>
-              <a:t>and C++</a:t>
-            </a:r>
-            <a:endParaRPr lang="en-US" dirty="0" smtClean="0"/>
+              <a:t>Sensors and C++</a:t>
+            </a:r>
           </a:p>
           <a:p>
             <a:pPr lvl="1"/>
             <a:r>
               <a:rPr lang="en-US" dirty="0" smtClean="0"/>
-              <a:t>You’re going to read </a:t>
-            </a:r>
-            <a:r>
-              <a:rPr lang="en-US" dirty="0" smtClean="0"/>
-              <a:t>in from the Accelerometer and Compass in C++</a:t>
-            </a:r>
-            <a:endParaRPr lang="en-US" dirty="0" smtClean="0"/>
+              <a:t>You’re going to read in from the Accelerometer and Compass in C++</a:t>
+            </a:r>
           </a:p>
           <a:p>
             <a:pPr lvl="1"/>
@@ -26952,24 +26955,11 @@
           <a:p>
             <a:r>
               <a:rPr lang="en-US" dirty="0" smtClean="0"/>
-              <a:t>Make sure you have the right capabilities checked</a:t>
-            </a:r>
-          </a:p>
-          <a:p>
-            <a:pPr lvl="1"/>
-            <a:r>
-              <a:rPr lang="en-US" dirty="0" smtClean="0"/>
-              <a:t>For this homework, we only need to check “Location”.</a:t>
-            </a:r>
-          </a:p>
-          <a:p>
-            <a:pPr lvl="1"/>
-            <a:endParaRPr lang="en-US" dirty="0"/>
-          </a:p>
-          <a:p>
-            <a:r>
-              <a:rPr lang="en-US" dirty="0" smtClean="0"/>
-              <a:t>Useful Namespaces:</a:t>
+              <a:t>Useful </a:t>
+            </a:r>
+            <a:r>
+              <a:rPr lang="en-US" dirty="0" smtClean="0"/>
+              <a:t>Namespaces:</a:t>
             </a:r>
           </a:p>
           <a:p>
@@ -27023,11 +27013,24 @@
           <a:p>
             <a:r>
               <a:rPr lang="en-US" dirty="0" smtClean="0"/>
-              <a:t>If you don’t want your app to rotate</a:t>
-            </a:r>
-            <a:r>
-              <a:rPr lang="en-US" dirty="0" smtClean="0"/>
-              <a:t>, the setting is in the app manifest, check only “portrait”</a:t>
+              <a:t>If you don’t want your app to rotate, the setting is in the app manifest, check only “portrait</a:t>
+            </a:r>
+            <a:r>
+              <a:rPr lang="en-US" dirty="0" smtClean="0"/>
+              <a:t>”</a:t>
+            </a:r>
+          </a:p>
+          <a:p>
+            <a:endParaRPr lang="en-US" dirty="0"/>
+          </a:p>
+          <a:p>
+            <a:r>
+              <a:rPr lang="en-US" dirty="0" smtClean="0"/>
+              <a:t>Remember, start on this early, since HW3 and beyond will be due one week </a:t>
+            </a:r>
+            <a:r>
+              <a:rPr lang="en-US" smtClean="0"/>
+              <a:t>after assignment!</a:t>
             </a:r>
             <a:endParaRPr lang="en-US" dirty="0" smtClean="0"/>
           </a:p>
@@ -27122,6 +27125,13 @@
   <p:clrMapOvr>
     <a:masterClrMapping/>
   </p:clrMapOvr>
+  <p:timing>
+    <p:tnLst>
+      <p:par>
+        <p:cTn xmlns:p14="http://schemas.microsoft.com/office/powerpoint/2010/main" id="1" dur="indefinite" restart="never" nodeType="tmRoot"/>
+      </p:par>
+    </p:tnLst>
+  </p:timing>
 </p:sld>
 </file>
 

</xml_diff>